<commit_message>
Added reduced use case for exchange and inserted slide in presentation
</commit_message>
<xml_diff>
--- a/doc/sharely_presentation_part.pptx
+++ b/doc/sharely_presentation_part.pptx
@@ -117,6 +117,22 @@
       </a:defRPr>
     </a:lvl9pPr>
   </p:defaultTextStyle>
+  <p:extLst>
+    <p:ext uri="{EFAFB233-063F-42B5-8137-9DF3F51BA10A}">
+      <p15:sldGuideLst xmlns:p15="http://schemas.microsoft.com/office/powerpoint/2012/main">
+        <p15:guide id="1" orient="horz" pos="2160">
+          <p15:clr>
+            <a:srgbClr val="A4A3A4"/>
+          </p15:clr>
+        </p15:guide>
+        <p15:guide id="2" pos="2880">
+          <p15:clr>
+            <a:srgbClr val="A4A3A4"/>
+          </p15:clr>
+        </p15:guide>
+      </p15:sldGuideLst>
+    </p:ext>
+  </p:extLst>
 </p:presentation>
 </file>
 
@@ -4724,12 +4740,12 @@
       </p:grpSpPr>
       <p:sp>
         <p:nvSpPr>
-          <p:cNvPr id="2" name="Inhaltsplatzhalter 1"/>
-          <p:cNvSpPr>
-            <a:spLocks noGrp="1"/>
-          </p:cNvSpPr>
-          <p:nvPr>
-            <p:ph idx="1"/>
+          <p:cNvPr id="3" name="Titel 2"/>
+          <p:cNvSpPr>
+            <a:spLocks noGrp="1"/>
+          </p:cNvSpPr>
+          <p:nvPr>
+            <p:ph type="title"/>
           </p:nvPr>
         </p:nvSpPr>
         <p:spPr/>
@@ -4739,35 +4755,41 @@
           <a:p>
             <a:r>
               <a:rPr lang="de-CH" dirty="0" smtClean="0"/>
-              <a:t>Hier kommt der Seitenaufbau</a:t>
+              <a:t>Tausch</a:t>
             </a:r>
             <a:endParaRPr lang="en-GB" dirty="0"/>
           </a:p>
         </p:txBody>
       </p:sp>
-      <p:sp>
-        <p:nvSpPr>
-          <p:cNvPr id="3" name="Titel 2"/>
-          <p:cNvSpPr>
-            <a:spLocks noGrp="1"/>
-          </p:cNvSpPr>
-          <p:nvPr>
-            <p:ph type="title"/>
-          </p:nvPr>
-        </p:nvSpPr>
-        <p:spPr/>
-        <p:txBody>
-          <a:bodyPr/>
-          <a:lstStyle/>
-          <a:p>
-            <a:r>
-              <a:rPr lang="de-CH" dirty="0" smtClean="0"/>
-              <a:t>Design</a:t>
-            </a:r>
-            <a:endParaRPr lang="en-GB" dirty="0"/>
-          </a:p>
-        </p:txBody>
-      </p:sp>
+      <p:pic>
+        <p:nvPicPr>
+          <p:cNvPr id="5" name="Inhaltsplatzhalter 4"/>
+          <p:cNvPicPr>
+            <a:picLocks noGrp="1" noChangeAspect="1"/>
+          </p:cNvPicPr>
+          <p:nvPr>
+            <p:ph idx="1"/>
+          </p:nvPr>
+        </p:nvPicPr>
+        <p:blipFill>
+          <a:blip r:embed="rId2">
+            <a:extLst>
+              <a:ext uri="{28A0092B-C50C-407E-A947-70E740481C1C}">
+                <a14:useLocalDpi xmlns:a14="http://schemas.microsoft.com/office/drawing/2010/main" val="0"/>
+              </a:ext>
+            </a:extLst>
+          </a:blip>
+          <a:stretch>
+            <a:fillRect/>
+          </a:stretch>
+        </p:blipFill>
+        <p:spPr>
+          <a:xfrm>
+            <a:off x="1393231" y="1481138"/>
+            <a:ext cx="6357538" cy="4525962"/>
+          </a:xfrm>
+        </p:spPr>
+      </p:pic>
     </p:spTree>
   </p:cSld>
   <p:clrMapOvr>
@@ -5192,7 +5214,6 @@
               <a:rPr lang="de-CH" dirty="0" smtClean="0"/>
               <a:t>Technologien</a:t>
             </a:r>
-            <a:endParaRPr lang="de-CH" dirty="0" smtClean="0"/>
           </a:p>
           <a:p>
             <a:r>
@@ -5223,7 +5244,6 @@
               <a:rPr lang="de-CH" dirty="0" smtClean="0"/>
               <a:t>Fragen</a:t>
             </a:r>
-            <a:endParaRPr lang="de-CH" dirty="0" smtClean="0"/>
           </a:p>
           <a:p>
             <a:endParaRPr lang="de-CH" dirty="0" smtClean="0"/>
@@ -5811,7 +5831,6 @@
               <a:rPr lang="de-CH" dirty="0" smtClean="0"/>
               <a:t>Dynamische Navigation anhand Umkreissuche</a:t>
             </a:r>
-            <a:endParaRPr lang="de-CH" dirty="0" smtClean="0"/>
           </a:p>
           <a:p>
             <a:endParaRPr lang="en-GB" dirty="0"/>

</xml_diff>